<commit_message>
rubah desain dan ppt
</commit_message>
<xml_diff>
--- a/Aplikasi Persawaan VCD/Kelompok 7 RENTAL VCD.pptx
+++ b/Aplikasi Persawaan VCD/Kelompok 7 RENTAL VCD.pptx
@@ -145,7 +145,7 @@
           <p:cNvPr id="2" name="Title 1">
             <a:extLst>
               <a:ext uri="{FF2B5EF4-FFF2-40B4-BE49-F238E27FC236}">
-                <a16:creationId xmlns="" xmlns:a16="http://schemas.microsoft.com/office/drawing/2014/main" id="{0344844A-56BD-48CC-A082-DED6A219E7CB}"/>
+                <a16:creationId xmlns:a16="http://schemas.microsoft.com/office/drawing/2014/main" xmlns="" id="{0344844A-56BD-48CC-A082-DED6A219E7CB}"/>
               </a:ext>
             </a:extLst>
           </p:cNvPr>
@@ -183,7 +183,7 @@
           <p:cNvPr id="3" name="Subtitle 2">
             <a:extLst>
               <a:ext uri="{FF2B5EF4-FFF2-40B4-BE49-F238E27FC236}">
-                <a16:creationId xmlns="" xmlns:a16="http://schemas.microsoft.com/office/drawing/2014/main" id="{867D9749-9CF1-4791-9568-9C570CFCA966}"/>
+                <a16:creationId xmlns:a16="http://schemas.microsoft.com/office/drawing/2014/main" xmlns="" id="{867D9749-9CF1-4791-9568-9C570CFCA966}"/>
               </a:ext>
             </a:extLst>
           </p:cNvPr>
@@ -254,7 +254,7 @@
           <p:cNvPr id="4" name="Date Placeholder 3">
             <a:extLst>
               <a:ext uri="{FF2B5EF4-FFF2-40B4-BE49-F238E27FC236}">
-                <a16:creationId xmlns="" xmlns:a16="http://schemas.microsoft.com/office/drawing/2014/main" id="{A1EEB06E-6E24-474B-85BA-274DAECF641A}"/>
+                <a16:creationId xmlns:a16="http://schemas.microsoft.com/office/drawing/2014/main" xmlns="" id="{A1EEB06E-6E24-474B-85BA-274DAECF641A}"/>
               </a:ext>
             </a:extLst>
           </p:cNvPr>
@@ -283,7 +283,7 @@
           <p:cNvPr id="5" name="Footer Placeholder 4">
             <a:extLst>
               <a:ext uri="{FF2B5EF4-FFF2-40B4-BE49-F238E27FC236}">
-                <a16:creationId xmlns="" xmlns:a16="http://schemas.microsoft.com/office/drawing/2014/main" id="{1EB1E6CF-A315-457E-A066-F871A8F15496}"/>
+                <a16:creationId xmlns:a16="http://schemas.microsoft.com/office/drawing/2014/main" xmlns="" id="{1EB1E6CF-A315-457E-A066-F871A8F15496}"/>
               </a:ext>
             </a:extLst>
           </p:cNvPr>
@@ -308,7 +308,7 @@
           <p:cNvPr id="6" name="Slide Number Placeholder 5">
             <a:extLst>
               <a:ext uri="{FF2B5EF4-FFF2-40B4-BE49-F238E27FC236}">
-                <a16:creationId xmlns="" xmlns:a16="http://schemas.microsoft.com/office/drawing/2014/main" id="{288EC1D1-B6AE-48B7-94D4-219F6E43E72E}"/>
+                <a16:creationId xmlns:a16="http://schemas.microsoft.com/office/drawing/2014/main" xmlns="" id="{288EC1D1-B6AE-48B7-94D4-219F6E43E72E}"/>
               </a:ext>
             </a:extLst>
           </p:cNvPr>
@@ -367,7 +367,7 @@
           <p:cNvPr id="2" name="Title 1">
             <a:extLst>
               <a:ext uri="{FF2B5EF4-FFF2-40B4-BE49-F238E27FC236}">
-                <a16:creationId xmlns="" xmlns:a16="http://schemas.microsoft.com/office/drawing/2014/main" id="{7264C23A-BCAB-4728-9BFE-50FB15C52666}"/>
+                <a16:creationId xmlns:a16="http://schemas.microsoft.com/office/drawing/2014/main" xmlns="" id="{7264C23A-BCAB-4728-9BFE-50FB15C52666}"/>
               </a:ext>
             </a:extLst>
           </p:cNvPr>
@@ -396,7 +396,7 @@
           <p:cNvPr id="3" name="Vertical Text Placeholder 2">
             <a:extLst>
               <a:ext uri="{FF2B5EF4-FFF2-40B4-BE49-F238E27FC236}">
-                <a16:creationId xmlns="" xmlns:a16="http://schemas.microsoft.com/office/drawing/2014/main" id="{9F97718C-4198-4C03-A91D-64449907D0C2}"/>
+                <a16:creationId xmlns:a16="http://schemas.microsoft.com/office/drawing/2014/main" xmlns="" id="{9F97718C-4198-4C03-A91D-64449907D0C2}"/>
               </a:ext>
             </a:extLst>
           </p:cNvPr>
@@ -454,7 +454,7 @@
           <p:cNvPr id="4" name="Date Placeholder 3">
             <a:extLst>
               <a:ext uri="{FF2B5EF4-FFF2-40B4-BE49-F238E27FC236}">
-                <a16:creationId xmlns="" xmlns:a16="http://schemas.microsoft.com/office/drawing/2014/main" id="{877C887B-E08E-4593-B5BB-F6FD208AE6AD}"/>
+                <a16:creationId xmlns:a16="http://schemas.microsoft.com/office/drawing/2014/main" xmlns="" id="{877C887B-E08E-4593-B5BB-F6FD208AE6AD}"/>
               </a:ext>
             </a:extLst>
           </p:cNvPr>
@@ -483,7 +483,7 @@
           <p:cNvPr id="5" name="Footer Placeholder 4">
             <a:extLst>
               <a:ext uri="{FF2B5EF4-FFF2-40B4-BE49-F238E27FC236}">
-                <a16:creationId xmlns="" xmlns:a16="http://schemas.microsoft.com/office/drawing/2014/main" id="{B6A2E77D-D321-454C-B164-DC5E6AE31C3B}"/>
+                <a16:creationId xmlns:a16="http://schemas.microsoft.com/office/drawing/2014/main" xmlns="" id="{B6A2E77D-D321-454C-B164-DC5E6AE31C3B}"/>
               </a:ext>
             </a:extLst>
           </p:cNvPr>
@@ -508,7 +508,7 @@
           <p:cNvPr id="6" name="Slide Number Placeholder 5">
             <a:extLst>
               <a:ext uri="{FF2B5EF4-FFF2-40B4-BE49-F238E27FC236}">
-                <a16:creationId xmlns="" xmlns:a16="http://schemas.microsoft.com/office/drawing/2014/main" id="{AF904429-FCDC-41F8-A434-97478EE4A733}"/>
+                <a16:creationId xmlns:a16="http://schemas.microsoft.com/office/drawing/2014/main" xmlns="" id="{AF904429-FCDC-41F8-A434-97478EE4A733}"/>
               </a:ext>
             </a:extLst>
           </p:cNvPr>
@@ -567,7 +567,7 @@
           <p:cNvPr id="2" name="Vertical Title 1">
             <a:extLst>
               <a:ext uri="{FF2B5EF4-FFF2-40B4-BE49-F238E27FC236}">
-                <a16:creationId xmlns="" xmlns:a16="http://schemas.microsoft.com/office/drawing/2014/main" id="{FC4FAD42-8528-43E7-9E45-F043706D9F13}"/>
+                <a16:creationId xmlns:a16="http://schemas.microsoft.com/office/drawing/2014/main" xmlns="" id="{FC4FAD42-8528-43E7-9E45-F043706D9F13}"/>
               </a:ext>
             </a:extLst>
           </p:cNvPr>
@@ -601,7 +601,7 @@
           <p:cNvPr id="3" name="Vertical Text Placeholder 2">
             <a:extLst>
               <a:ext uri="{FF2B5EF4-FFF2-40B4-BE49-F238E27FC236}">
-                <a16:creationId xmlns="" xmlns:a16="http://schemas.microsoft.com/office/drawing/2014/main" id="{31D2A090-15A2-417F-9067-CCB61B805C6A}"/>
+                <a16:creationId xmlns:a16="http://schemas.microsoft.com/office/drawing/2014/main" xmlns="" id="{31D2A090-15A2-417F-9067-CCB61B805C6A}"/>
               </a:ext>
             </a:extLst>
           </p:cNvPr>
@@ -664,7 +664,7 @@
           <p:cNvPr id="4" name="Date Placeholder 3">
             <a:extLst>
               <a:ext uri="{FF2B5EF4-FFF2-40B4-BE49-F238E27FC236}">
-                <a16:creationId xmlns="" xmlns:a16="http://schemas.microsoft.com/office/drawing/2014/main" id="{F4072C00-749D-4940-AA21-92DE1549D18F}"/>
+                <a16:creationId xmlns:a16="http://schemas.microsoft.com/office/drawing/2014/main" xmlns="" id="{F4072C00-749D-4940-AA21-92DE1549D18F}"/>
               </a:ext>
             </a:extLst>
           </p:cNvPr>
@@ -693,7 +693,7 @@
           <p:cNvPr id="5" name="Footer Placeholder 4">
             <a:extLst>
               <a:ext uri="{FF2B5EF4-FFF2-40B4-BE49-F238E27FC236}">
-                <a16:creationId xmlns="" xmlns:a16="http://schemas.microsoft.com/office/drawing/2014/main" id="{1C7A5E0E-9795-4BC7-8010-0B52A3A5D5B6}"/>
+                <a16:creationId xmlns:a16="http://schemas.microsoft.com/office/drawing/2014/main" xmlns="" id="{1C7A5E0E-9795-4BC7-8010-0B52A3A5D5B6}"/>
               </a:ext>
             </a:extLst>
           </p:cNvPr>
@@ -718,7 +718,7 @@
           <p:cNvPr id="6" name="Slide Number Placeholder 5">
             <a:extLst>
               <a:ext uri="{FF2B5EF4-FFF2-40B4-BE49-F238E27FC236}">
-                <a16:creationId xmlns="" xmlns:a16="http://schemas.microsoft.com/office/drawing/2014/main" id="{C652E532-7A05-4F61-8920-EE2C04789AC2}"/>
+                <a16:creationId xmlns:a16="http://schemas.microsoft.com/office/drawing/2014/main" xmlns="" id="{C652E532-7A05-4F61-8920-EE2C04789AC2}"/>
               </a:ext>
             </a:extLst>
           </p:cNvPr>
@@ -777,7 +777,7 @@
           <p:cNvPr id="2" name="Title 1">
             <a:extLst>
               <a:ext uri="{FF2B5EF4-FFF2-40B4-BE49-F238E27FC236}">
-                <a16:creationId xmlns="" xmlns:a16="http://schemas.microsoft.com/office/drawing/2014/main" id="{3C173F2F-02AB-4E10-A2E7-0F2988FA4073}"/>
+                <a16:creationId xmlns:a16="http://schemas.microsoft.com/office/drawing/2014/main" xmlns="" id="{3C173F2F-02AB-4E10-A2E7-0F2988FA4073}"/>
               </a:ext>
             </a:extLst>
           </p:cNvPr>
@@ -806,7 +806,7 @@
           <p:cNvPr id="3" name="Content Placeholder 2">
             <a:extLst>
               <a:ext uri="{FF2B5EF4-FFF2-40B4-BE49-F238E27FC236}">
-                <a16:creationId xmlns="" xmlns:a16="http://schemas.microsoft.com/office/drawing/2014/main" id="{363589AB-95E7-491A-A32C-95608A709E72}"/>
+                <a16:creationId xmlns:a16="http://schemas.microsoft.com/office/drawing/2014/main" xmlns="" id="{363589AB-95E7-491A-A32C-95608A709E72}"/>
               </a:ext>
             </a:extLst>
           </p:cNvPr>
@@ -864,7 +864,7 @@
           <p:cNvPr id="4" name="Date Placeholder 3">
             <a:extLst>
               <a:ext uri="{FF2B5EF4-FFF2-40B4-BE49-F238E27FC236}">
-                <a16:creationId xmlns="" xmlns:a16="http://schemas.microsoft.com/office/drawing/2014/main" id="{1BD9B825-C62C-41C6-938B-79CE4BE0A7C0}"/>
+                <a16:creationId xmlns:a16="http://schemas.microsoft.com/office/drawing/2014/main" xmlns="" id="{1BD9B825-C62C-41C6-938B-79CE4BE0A7C0}"/>
               </a:ext>
             </a:extLst>
           </p:cNvPr>
@@ -893,7 +893,7 @@
           <p:cNvPr id="5" name="Footer Placeholder 4">
             <a:extLst>
               <a:ext uri="{FF2B5EF4-FFF2-40B4-BE49-F238E27FC236}">
-                <a16:creationId xmlns="" xmlns:a16="http://schemas.microsoft.com/office/drawing/2014/main" id="{835F0D3A-5918-4CFE-A39C-4EA17B0276B9}"/>
+                <a16:creationId xmlns:a16="http://schemas.microsoft.com/office/drawing/2014/main" xmlns="" id="{835F0D3A-5918-4CFE-A39C-4EA17B0276B9}"/>
               </a:ext>
             </a:extLst>
           </p:cNvPr>
@@ -918,7 +918,7 @@
           <p:cNvPr id="6" name="Slide Number Placeholder 5">
             <a:extLst>
               <a:ext uri="{FF2B5EF4-FFF2-40B4-BE49-F238E27FC236}">
-                <a16:creationId xmlns="" xmlns:a16="http://schemas.microsoft.com/office/drawing/2014/main" id="{D478883D-DC69-4B28-BE58-334C131EF46A}"/>
+                <a16:creationId xmlns:a16="http://schemas.microsoft.com/office/drawing/2014/main" xmlns="" id="{D478883D-DC69-4B28-BE58-334C131EF46A}"/>
               </a:ext>
             </a:extLst>
           </p:cNvPr>
@@ -977,7 +977,7 @@
           <p:cNvPr id="2" name="Title 1">
             <a:extLst>
               <a:ext uri="{FF2B5EF4-FFF2-40B4-BE49-F238E27FC236}">
-                <a16:creationId xmlns="" xmlns:a16="http://schemas.microsoft.com/office/drawing/2014/main" id="{748B3F02-9E17-491C-8543-F7D7E0E2AB52}"/>
+                <a16:creationId xmlns:a16="http://schemas.microsoft.com/office/drawing/2014/main" xmlns="" id="{748B3F02-9E17-491C-8543-F7D7E0E2AB52}"/>
               </a:ext>
             </a:extLst>
           </p:cNvPr>
@@ -1015,7 +1015,7 @@
           <p:cNvPr id="3" name="Text Placeholder 2">
             <a:extLst>
               <a:ext uri="{FF2B5EF4-FFF2-40B4-BE49-F238E27FC236}">
-                <a16:creationId xmlns="" xmlns:a16="http://schemas.microsoft.com/office/drawing/2014/main" id="{6D500845-1D7F-41BA-8584-5C67E6BC7E5A}"/>
+                <a16:creationId xmlns:a16="http://schemas.microsoft.com/office/drawing/2014/main" xmlns="" id="{6D500845-1D7F-41BA-8584-5C67E6BC7E5A}"/>
               </a:ext>
             </a:extLst>
           </p:cNvPr>
@@ -1140,7 +1140,7 @@
           <p:cNvPr id="4" name="Date Placeholder 3">
             <a:extLst>
               <a:ext uri="{FF2B5EF4-FFF2-40B4-BE49-F238E27FC236}">
-                <a16:creationId xmlns="" xmlns:a16="http://schemas.microsoft.com/office/drawing/2014/main" id="{0793B5F5-1A79-4F72-9619-200E8D51BB06}"/>
+                <a16:creationId xmlns:a16="http://schemas.microsoft.com/office/drawing/2014/main" xmlns="" id="{0793B5F5-1A79-4F72-9619-200E8D51BB06}"/>
               </a:ext>
             </a:extLst>
           </p:cNvPr>
@@ -1169,7 +1169,7 @@
           <p:cNvPr id="5" name="Footer Placeholder 4">
             <a:extLst>
               <a:ext uri="{FF2B5EF4-FFF2-40B4-BE49-F238E27FC236}">
-                <a16:creationId xmlns="" xmlns:a16="http://schemas.microsoft.com/office/drawing/2014/main" id="{42D09C9F-D1BD-4A6F-8045-FCBF04B4D70D}"/>
+                <a16:creationId xmlns:a16="http://schemas.microsoft.com/office/drawing/2014/main" xmlns="" id="{42D09C9F-D1BD-4A6F-8045-FCBF04B4D70D}"/>
               </a:ext>
             </a:extLst>
           </p:cNvPr>
@@ -1194,7 +1194,7 @@
           <p:cNvPr id="6" name="Slide Number Placeholder 5">
             <a:extLst>
               <a:ext uri="{FF2B5EF4-FFF2-40B4-BE49-F238E27FC236}">
-                <a16:creationId xmlns="" xmlns:a16="http://schemas.microsoft.com/office/drawing/2014/main" id="{0381DFCA-11AC-4F75-B575-A8EF50FEE393}"/>
+                <a16:creationId xmlns:a16="http://schemas.microsoft.com/office/drawing/2014/main" xmlns="" id="{0381DFCA-11AC-4F75-B575-A8EF50FEE393}"/>
               </a:ext>
             </a:extLst>
           </p:cNvPr>
@@ -1253,7 +1253,7 @@
           <p:cNvPr id="2" name="Title 1">
             <a:extLst>
               <a:ext uri="{FF2B5EF4-FFF2-40B4-BE49-F238E27FC236}">
-                <a16:creationId xmlns="" xmlns:a16="http://schemas.microsoft.com/office/drawing/2014/main" id="{79E01FA9-B64D-4C59-BDC8-E55B1E5EF240}"/>
+                <a16:creationId xmlns:a16="http://schemas.microsoft.com/office/drawing/2014/main" xmlns="" id="{79E01FA9-B64D-4C59-BDC8-E55B1E5EF240}"/>
               </a:ext>
             </a:extLst>
           </p:cNvPr>
@@ -1282,7 +1282,7 @@
           <p:cNvPr id="3" name="Content Placeholder 2">
             <a:extLst>
               <a:ext uri="{FF2B5EF4-FFF2-40B4-BE49-F238E27FC236}">
-                <a16:creationId xmlns="" xmlns:a16="http://schemas.microsoft.com/office/drawing/2014/main" id="{1F081258-E6AB-493F-AF02-169300855592}"/>
+                <a16:creationId xmlns:a16="http://schemas.microsoft.com/office/drawing/2014/main" xmlns="" id="{1F081258-E6AB-493F-AF02-169300855592}"/>
               </a:ext>
             </a:extLst>
           </p:cNvPr>
@@ -1345,7 +1345,7 @@
           <p:cNvPr id="4" name="Content Placeholder 3">
             <a:extLst>
               <a:ext uri="{FF2B5EF4-FFF2-40B4-BE49-F238E27FC236}">
-                <a16:creationId xmlns="" xmlns:a16="http://schemas.microsoft.com/office/drawing/2014/main" id="{EE293DDB-6405-4454-9793-CBBBFF5C5A73}"/>
+                <a16:creationId xmlns:a16="http://schemas.microsoft.com/office/drawing/2014/main" xmlns="" id="{EE293DDB-6405-4454-9793-CBBBFF5C5A73}"/>
               </a:ext>
             </a:extLst>
           </p:cNvPr>
@@ -1408,7 +1408,7 @@
           <p:cNvPr id="5" name="Date Placeholder 4">
             <a:extLst>
               <a:ext uri="{FF2B5EF4-FFF2-40B4-BE49-F238E27FC236}">
-                <a16:creationId xmlns="" xmlns:a16="http://schemas.microsoft.com/office/drawing/2014/main" id="{C393838C-1B17-4B12-8158-B3B71501D1F8}"/>
+                <a16:creationId xmlns:a16="http://schemas.microsoft.com/office/drawing/2014/main" xmlns="" id="{C393838C-1B17-4B12-8158-B3B71501D1F8}"/>
               </a:ext>
             </a:extLst>
           </p:cNvPr>
@@ -1437,7 +1437,7 @@
           <p:cNvPr id="6" name="Footer Placeholder 5">
             <a:extLst>
               <a:ext uri="{FF2B5EF4-FFF2-40B4-BE49-F238E27FC236}">
-                <a16:creationId xmlns="" xmlns:a16="http://schemas.microsoft.com/office/drawing/2014/main" id="{7751D5AB-0025-4E8D-A6FC-9BD51520E471}"/>
+                <a16:creationId xmlns:a16="http://schemas.microsoft.com/office/drawing/2014/main" xmlns="" id="{7751D5AB-0025-4E8D-A6FC-9BD51520E471}"/>
               </a:ext>
             </a:extLst>
           </p:cNvPr>
@@ -1462,7 +1462,7 @@
           <p:cNvPr id="7" name="Slide Number Placeholder 6">
             <a:extLst>
               <a:ext uri="{FF2B5EF4-FFF2-40B4-BE49-F238E27FC236}">
-                <a16:creationId xmlns="" xmlns:a16="http://schemas.microsoft.com/office/drawing/2014/main" id="{F7F26A9D-1151-464D-B384-0DBD32A4F97C}"/>
+                <a16:creationId xmlns:a16="http://schemas.microsoft.com/office/drawing/2014/main" xmlns="" id="{F7F26A9D-1151-464D-B384-0DBD32A4F97C}"/>
               </a:ext>
             </a:extLst>
           </p:cNvPr>
@@ -1521,7 +1521,7 @@
           <p:cNvPr id="2" name="Title 1">
             <a:extLst>
               <a:ext uri="{FF2B5EF4-FFF2-40B4-BE49-F238E27FC236}">
-                <a16:creationId xmlns="" xmlns:a16="http://schemas.microsoft.com/office/drawing/2014/main" id="{3567E2AA-1267-4E9F-ADB2-5CF71FDE6C96}"/>
+                <a16:creationId xmlns:a16="http://schemas.microsoft.com/office/drawing/2014/main" xmlns="" id="{3567E2AA-1267-4E9F-ADB2-5CF71FDE6C96}"/>
               </a:ext>
             </a:extLst>
           </p:cNvPr>
@@ -1555,7 +1555,7 @@
           <p:cNvPr id="3" name="Text Placeholder 2">
             <a:extLst>
               <a:ext uri="{FF2B5EF4-FFF2-40B4-BE49-F238E27FC236}">
-                <a16:creationId xmlns="" xmlns:a16="http://schemas.microsoft.com/office/drawing/2014/main" id="{6559996A-77DA-4B73-A756-58FB7A6484D6}"/>
+                <a16:creationId xmlns:a16="http://schemas.microsoft.com/office/drawing/2014/main" xmlns="" id="{6559996A-77DA-4B73-A756-58FB7A6484D6}"/>
               </a:ext>
             </a:extLst>
           </p:cNvPr>
@@ -1626,7 +1626,7 @@
           <p:cNvPr id="4" name="Content Placeholder 3">
             <a:extLst>
               <a:ext uri="{FF2B5EF4-FFF2-40B4-BE49-F238E27FC236}">
-                <a16:creationId xmlns="" xmlns:a16="http://schemas.microsoft.com/office/drawing/2014/main" id="{3509E259-1708-4F60-AA5B-1309EA383C1F}"/>
+                <a16:creationId xmlns:a16="http://schemas.microsoft.com/office/drawing/2014/main" xmlns="" id="{3509E259-1708-4F60-AA5B-1309EA383C1F}"/>
               </a:ext>
             </a:extLst>
           </p:cNvPr>
@@ -1689,7 +1689,7 @@
           <p:cNvPr id="5" name="Text Placeholder 4">
             <a:extLst>
               <a:ext uri="{FF2B5EF4-FFF2-40B4-BE49-F238E27FC236}">
-                <a16:creationId xmlns="" xmlns:a16="http://schemas.microsoft.com/office/drawing/2014/main" id="{7E4BA29C-D9B2-41E5-B118-2EC948757264}"/>
+                <a16:creationId xmlns:a16="http://schemas.microsoft.com/office/drawing/2014/main" xmlns="" id="{7E4BA29C-D9B2-41E5-B118-2EC948757264}"/>
               </a:ext>
             </a:extLst>
           </p:cNvPr>
@@ -1760,7 +1760,7 @@
           <p:cNvPr id="6" name="Content Placeholder 5">
             <a:extLst>
               <a:ext uri="{FF2B5EF4-FFF2-40B4-BE49-F238E27FC236}">
-                <a16:creationId xmlns="" xmlns:a16="http://schemas.microsoft.com/office/drawing/2014/main" id="{78E72C17-BF68-4099-B3D4-CBC1DFB8EAC8}"/>
+                <a16:creationId xmlns:a16="http://schemas.microsoft.com/office/drawing/2014/main" xmlns="" id="{78E72C17-BF68-4099-B3D4-CBC1DFB8EAC8}"/>
               </a:ext>
             </a:extLst>
           </p:cNvPr>
@@ -1823,7 +1823,7 @@
           <p:cNvPr id="7" name="Date Placeholder 6">
             <a:extLst>
               <a:ext uri="{FF2B5EF4-FFF2-40B4-BE49-F238E27FC236}">
-                <a16:creationId xmlns="" xmlns:a16="http://schemas.microsoft.com/office/drawing/2014/main" id="{8EBCCB20-EA9E-4AE0-96F3-8B0E6CB06FE7}"/>
+                <a16:creationId xmlns:a16="http://schemas.microsoft.com/office/drawing/2014/main" xmlns="" id="{8EBCCB20-EA9E-4AE0-96F3-8B0E6CB06FE7}"/>
               </a:ext>
             </a:extLst>
           </p:cNvPr>
@@ -1852,7 +1852,7 @@
           <p:cNvPr id="8" name="Footer Placeholder 7">
             <a:extLst>
               <a:ext uri="{FF2B5EF4-FFF2-40B4-BE49-F238E27FC236}">
-                <a16:creationId xmlns="" xmlns:a16="http://schemas.microsoft.com/office/drawing/2014/main" id="{5EC33E31-902F-4659-8FC4-5108494D57A5}"/>
+                <a16:creationId xmlns:a16="http://schemas.microsoft.com/office/drawing/2014/main" xmlns="" id="{5EC33E31-902F-4659-8FC4-5108494D57A5}"/>
               </a:ext>
             </a:extLst>
           </p:cNvPr>
@@ -1877,7 +1877,7 @@
           <p:cNvPr id="9" name="Slide Number Placeholder 8">
             <a:extLst>
               <a:ext uri="{FF2B5EF4-FFF2-40B4-BE49-F238E27FC236}">
-                <a16:creationId xmlns="" xmlns:a16="http://schemas.microsoft.com/office/drawing/2014/main" id="{7505733C-9C11-4B97-95BE-87E360531C2A}"/>
+                <a16:creationId xmlns:a16="http://schemas.microsoft.com/office/drawing/2014/main" xmlns="" id="{7505733C-9C11-4B97-95BE-87E360531C2A}"/>
               </a:ext>
             </a:extLst>
           </p:cNvPr>
@@ -1936,7 +1936,7 @@
           <p:cNvPr id="2" name="Title 1">
             <a:extLst>
               <a:ext uri="{FF2B5EF4-FFF2-40B4-BE49-F238E27FC236}">
-                <a16:creationId xmlns="" xmlns:a16="http://schemas.microsoft.com/office/drawing/2014/main" id="{819B9C0E-0FD4-4478-9363-8DD90E556357}"/>
+                <a16:creationId xmlns:a16="http://schemas.microsoft.com/office/drawing/2014/main" xmlns="" id="{819B9C0E-0FD4-4478-9363-8DD90E556357}"/>
               </a:ext>
             </a:extLst>
           </p:cNvPr>
@@ -1965,7 +1965,7 @@
           <p:cNvPr id="3" name="Date Placeholder 2">
             <a:extLst>
               <a:ext uri="{FF2B5EF4-FFF2-40B4-BE49-F238E27FC236}">
-                <a16:creationId xmlns="" xmlns:a16="http://schemas.microsoft.com/office/drawing/2014/main" id="{A3E3D306-7BA7-4486-A67F-7027DF3B7910}"/>
+                <a16:creationId xmlns:a16="http://schemas.microsoft.com/office/drawing/2014/main" xmlns="" id="{A3E3D306-7BA7-4486-A67F-7027DF3B7910}"/>
               </a:ext>
             </a:extLst>
           </p:cNvPr>
@@ -1994,7 +1994,7 @@
           <p:cNvPr id="4" name="Footer Placeholder 3">
             <a:extLst>
               <a:ext uri="{FF2B5EF4-FFF2-40B4-BE49-F238E27FC236}">
-                <a16:creationId xmlns="" xmlns:a16="http://schemas.microsoft.com/office/drawing/2014/main" id="{01C14269-21F5-4256-AA4A-BF9795B9D583}"/>
+                <a16:creationId xmlns:a16="http://schemas.microsoft.com/office/drawing/2014/main" xmlns="" id="{01C14269-21F5-4256-AA4A-BF9795B9D583}"/>
               </a:ext>
             </a:extLst>
           </p:cNvPr>
@@ -2019,7 +2019,7 @@
           <p:cNvPr id="5" name="Slide Number Placeholder 4">
             <a:extLst>
               <a:ext uri="{FF2B5EF4-FFF2-40B4-BE49-F238E27FC236}">
-                <a16:creationId xmlns="" xmlns:a16="http://schemas.microsoft.com/office/drawing/2014/main" id="{6AAE47A6-B96E-494E-A31D-E1245765D83B}"/>
+                <a16:creationId xmlns:a16="http://schemas.microsoft.com/office/drawing/2014/main" xmlns="" id="{6AAE47A6-B96E-494E-A31D-E1245765D83B}"/>
               </a:ext>
             </a:extLst>
           </p:cNvPr>
@@ -2078,7 +2078,7 @@
           <p:cNvPr id="2" name="Date Placeholder 1">
             <a:extLst>
               <a:ext uri="{FF2B5EF4-FFF2-40B4-BE49-F238E27FC236}">
-                <a16:creationId xmlns="" xmlns:a16="http://schemas.microsoft.com/office/drawing/2014/main" id="{39BD61C2-74C1-47FF-AD0E-761460DC6495}"/>
+                <a16:creationId xmlns:a16="http://schemas.microsoft.com/office/drawing/2014/main" xmlns="" id="{39BD61C2-74C1-47FF-AD0E-761460DC6495}"/>
               </a:ext>
             </a:extLst>
           </p:cNvPr>
@@ -2107,7 +2107,7 @@
           <p:cNvPr id="3" name="Footer Placeholder 2">
             <a:extLst>
               <a:ext uri="{FF2B5EF4-FFF2-40B4-BE49-F238E27FC236}">
-                <a16:creationId xmlns="" xmlns:a16="http://schemas.microsoft.com/office/drawing/2014/main" id="{BB88C240-BE27-47DF-982E-458D8C7EE074}"/>
+                <a16:creationId xmlns:a16="http://schemas.microsoft.com/office/drawing/2014/main" xmlns="" id="{BB88C240-BE27-47DF-982E-458D8C7EE074}"/>
               </a:ext>
             </a:extLst>
           </p:cNvPr>
@@ -2132,7 +2132,7 @@
           <p:cNvPr id="4" name="Slide Number Placeholder 3">
             <a:extLst>
               <a:ext uri="{FF2B5EF4-FFF2-40B4-BE49-F238E27FC236}">
-                <a16:creationId xmlns="" xmlns:a16="http://schemas.microsoft.com/office/drawing/2014/main" id="{1354AD97-E4B7-479D-9450-2D36644575EF}"/>
+                <a16:creationId xmlns:a16="http://schemas.microsoft.com/office/drawing/2014/main" xmlns="" id="{1354AD97-E4B7-479D-9450-2D36644575EF}"/>
               </a:ext>
             </a:extLst>
           </p:cNvPr>
@@ -2191,7 +2191,7 @@
           <p:cNvPr id="2" name="Title 1">
             <a:extLst>
               <a:ext uri="{FF2B5EF4-FFF2-40B4-BE49-F238E27FC236}">
-                <a16:creationId xmlns="" xmlns:a16="http://schemas.microsoft.com/office/drawing/2014/main" id="{5549B472-32B9-40DB-BDC6-E9A049F1C56B}"/>
+                <a16:creationId xmlns:a16="http://schemas.microsoft.com/office/drawing/2014/main" xmlns="" id="{5549B472-32B9-40DB-BDC6-E9A049F1C56B}"/>
               </a:ext>
             </a:extLst>
           </p:cNvPr>
@@ -2229,7 +2229,7 @@
           <p:cNvPr id="3" name="Content Placeholder 2">
             <a:extLst>
               <a:ext uri="{FF2B5EF4-FFF2-40B4-BE49-F238E27FC236}">
-                <a16:creationId xmlns="" xmlns:a16="http://schemas.microsoft.com/office/drawing/2014/main" id="{C4305C29-1494-47DC-A5D4-F00D6DEA70C6}"/>
+                <a16:creationId xmlns:a16="http://schemas.microsoft.com/office/drawing/2014/main" xmlns="" id="{C4305C29-1494-47DC-A5D4-F00D6DEA70C6}"/>
               </a:ext>
             </a:extLst>
           </p:cNvPr>
@@ -2320,7 +2320,7 @@
           <p:cNvPr id="4" name="Text Placeholder 3">
             <a:extLst>
               <a:ext uri="{FF2B5EF4-FFF2-40B4-BE49-F238E27FC236}">
-                <a16:creationId xmlns="" xmlns:a16="http://schemas.microsoft.com/office/drawing/2014/main" id="{E7907506-C13F-4093-BCB9-B3B42B1C2D4D}"/>
+                <a16:creationId xmlns:a16="http://schemas.microsoft.com/office/drawing/2014/main" xmlns="" id="{E7907506-C13F-4093-BCB9-B3B42B1C2D4D}"/>
               </a:ext>
             </a:extLst>
           </p:cNvPr>
@@ -2391,7 +2391,7 @@
           <p:cNvPr id="5" name="Date Placeholder 4">
             <a:extLst>
               <a:ext uri="{FF2B5EF4-FFF2-40B4-BE49-F238E27FC236}">
-                <a16:creationId xmlns="" xmlns:a16="http://schemas.microsoft.com/office/drawing/2014/main" id="{C1B1469A-E39F-4BB0-9923-31DB429A4565}"/>
+                <a16:creationId xmlns:a16="http://schemas.microsoft.com/office/drawing/2014/main" xmlns="" id="{C1B1469A-E39F-4BB0-9923-31DB429A4565}"/>
               </a:ext>
             </a:extLst>
           </p:cNvPr>
@@ -2420,7 +2420,7 @@
           <p:cNvPr id="6" name="Footer Placeholder 5">
             <a:extLst>
               <a:ext uri="{FF2B5EF4-FFF2-40B4-BE49-F238E27FC236}">
-                <a16:creationId xmlns="" xmlns:a16="http://schemas.microsoft.com/office/drawing/2014/main" id="{BBEB7697-9CC5-4B87-BABE-83E734E1F454}"/>
+                <a16:creationId xmlns:a16="http://schemas.microsoft.com/office/drawing/2014/main" xmlns="" id="{BBEB7697-9CC5-4B87-BABE-83E734E1F454}"/>
               </a:ext>
             </a:extLst>
           </p:cNvPr>
@@ -2445,7 +2445,7 @@
           <p:cNvPr id="7" name="Slide Number Placeholder 6">
             <a:extLst>
               <a:ext uri="{FF2B5EF4-FFF2-40B4-BE49-F238E27FC236}">
-                <a16:creationId xmlns="" xmlns:a16="http://schemas.microsoft.com/office/drawing/2014/main" id="{7D88D8ED-3C33-42A8-ABEA-3D0F073EC871}"/>
+                <a16:creationId xmlns:a16="http://schemas.microsoft.com/office/drawing/2014/main" xmlns="" id="{7D88D8ED-3C33-42A8-ABEA-3D0F073EC871}"/>
               </a:ext>
             </a:extLst>
           </p:cNvPr>
@@ -2504,7 +2504,7 @@
           <p:cNvPr id="2" name="Title 1">
             <a:extLst>
               <a:ext uri="{FF2B5EF4-FFF2-40B4-BE49-F238E27FC236}">
-                <a16:creationId xmlns="" xmlns:a16="http://schemas.microsoft.com/office/drawing/2014/main" id="{402AAA1F-7C42-4B6E-88AD-47CA1F24F259}"/>
+                <a16:creationId xmlns:a16="http://schemas.microsoft.com/office/drawing/2014/main" xmlns="" id="{402AAA1F-7C42-4B6E-88AD-47CA1F24F259}"/>
               </a:ext>
             </a:extLst>
           </p:cNvPr>
@@ -2542,7 +2542,7 @@
           <p:cNvPr id="3" name="Picture Placeholder 2">
             <a:extLst>
               <a:ext uri="{FF2B5EF4-FFF2-40B4-BE49-F238E27FC236}">
-                <a16:creationId xmlns="" xmlns:a16="http://schemas.microsoft.com/office/drawing/2014/main" id="{417873E4-0100-4D44-A024-1A0FAE56F0F4}"/>
+                <a16:creationId xmlns:a16="http://schemas.microsoft.com/office/drawing/2014/main" xmlns="" id="{417873E4-0100-4D44-A024-1A0FAE56F0F4}"/>
               </a:ext>
             </a:extLst>
           </p:cNvPr>
@@ -2609,7 +2609,7 @@
           <p:cNvPr id="4" name="Text Placeholder 3">
             <a:extLst>
               <a:ext uri="{FF2B5EF4-FFF2-40B4-BE49-F238E27FC236}">
-                <a16:creationId xmlns="" xmlns:a16="http://schemas.microsoft.com/office/drawing/2014/main" id="{AE744F5A-381E-4FB5-8F32-7ED91BBD397B}"/>
+                <a16:creationId xmlns:a16="http://schemas.microsoft.com/office/drawing/2014/main" xmlns="" id="{AE744F5A-381E-4FB5-8F32-7ED91BBD397B}"/>
               </a:ext>
             </a:extLst>
           </p:cNvPr>
@@ -2680,7 +2680,7 @@
           <p:cNvPr id="5" name="Date Placeholder 4">
             <a:extLst>
               <a:ext uri="{FF2B5EF4-FFF2-40B4-BE49-F238E27FC236}">
-                <a16:creationId xmlns="" xmlns:a16="http://schemas.microsoft.com/office/drawing/2014/main" id="{606A794C-F084-4A13-8060-9F04CBA23292}"/>
+                <a16:creationId xmlns:a16="http://schemas.microsoft.com/office/drawing/2014/main" xmlns="" id="{606A794C-F084-4A13-8060-9F04CBA23292}"/>
               </a:ext>
             </a:extLst>
           </p:cNvPr>
@@ -2709,7 +2709,7 @@
           <p:cNvPr id="6" name="Footer Placeholder 5">
             <a:extLst>
               <a:ext uri="{FF2B5EF4-FFF2-40B4-BE49-F238E27FC236}">
-                <a16:creationId xmlns="" xmlns:a16="http://schemas.microsoft.com/office/drawing/2014/main" id="{F9E9CA44-E642-4BB1-B377-9CA0FC337BD4}"/>
+                <a16:creationId xmlns:a16="http://schemas.microsoft.com/office/drawing/2014/main" xmlns="" id="{F9E9CA44-E642-4BB1-B377-9CA0FC337BD4}"/>
               </a:ext>
             </a:extLst>
           </p:cNvPr>
@@ -2734,7 +2734,7 @@
           <p:cNvPr id="7" name="Slide Number Placeholder 6">
             <a:extLst>
               <a:ext uri="{FF2B5EF4-FFF2-40B4-BE49-F238E27FC236}">
-                <a16:creationId xmlns="" xmlns:a16="http://schemas.microsoft.com/office/drawing/2014/main" id="{C54129BF-D501-4A89-A5A2-62FA401F03A6}"/>
+                <a16:creationId xmlns:a16="http://schemas.microsoft.com/office/drawing/2014/main" xmlns="" id="{C54129BF-D501-4A89-A5A2-62FA401F03A6}"/>
               </a:ext>
             </a:extLst>
           </p:cNvPr>
@@ -2798,7 +2798,7 @@
           <p:cNvPr id="2" name="Title Placeholder 1">
             <a:extLst>
               <a:ext uri="{FF2B5EF4-FFF2-40B4-BE49-F238E27FC236}">
-                <a16:creationId xmlns="" xmlns:a16="http://schemas.microsoft.com/office/drawing/2014/main" id="{0036D4D9-D13B-4602-AC6E-B5936573BB33}"/>
+                <a16:creationId xmlns:a16="http://schemas.microsoft.com/office/drawing/2014/main" xmlns="" id="{0036D4D9-D13B-4602-AC6E-B5936573BB33}"/>
               </a:ext>
             </a:extLst>
           </p:cNvPr>
@@ -2837,7 +2837,7 @@
           <p:cNvPr id="3" name="Text Placeholder 2">
             <a:extLst>
               <a:ext uri="{FF2B5EF4-FFF2-40B4-BE49-F238E27FC236}">
-                <a16:creationId xmlns="" xmlns:a16="http://schemas.microsoft.com/office/drawing/2014/main" id="{641728D6-03CF-46B5-9D7F-636451D3AF1E}"/>
+                <a16:creationId xmlns:a16="http://schemas.microsoft.com/office/drawing/2014/main" xmlns="" id="{641728D6-03CF-46B5-9D7F-636451D3AF1E}"/>
               </a:ext>
             </a:extLst>
           </p:cNvPr>
@@ -2905,7 +2905,7 @@
           <p:cNvPr id="4" name="Date Placeholder 3">
             <a:extLst>
               <a:ext uri="{FF2B5EF4-FFF2-40B4-BE49-F238E27FC236}">
-                <a16:creationId xmlns="" xmlns:a16="http://schemas.microsoft.com/office/drawing/2014/main" id="{83FB0A78-6D21-47A6-B4F7-AA7CF8A5CAE8}"/>
+                <a16:creationId xmlns:a16="http://schemas.microsoft.com/office/drawing/2014/main" xmlns="" id="{83FB0A78-6D21-47A6-B4F7-AA7CF8A5CAE8}"/>
               </a:ext>
             </a:extLst>
           </p:cNvPr>
@@ -2952,7 +2952,7 @@
           <p:cNvPr id="5" name="Footer Placeholder 4">
             <a:extLst>
               <a:ext uri="{FF2B5EF4-FFF2-40B4-BE49-F238E27FC236}">
-                <a16:creationId xmlns="" xmlns:a16="http://schemas.microsoft.com/office/drawing/2014/main" id="{24DB5A9C-890D-4AE1-80E7-6FDB893E71A2}"/>
+                <a16:creationId xmlns:a16="http://schemas.microsoft.com/office/drawing/2014/main" xmlns="" id="{24DB5A9C-890D-4AE1-80E7-6FDB893E71A2}"/>
               </a:ext>
             </a:extLst>
           </p:cNvPr>
@@ -2995,7 +2995,7 @@
           <p:cNvPr id="6" name="Slide Number Placeholder 5">
             <a:extLst>
               <a:ext uri="{FF2B5EF4-FFF2-40B4-BE49-F238E27FC236}">
-                <a16:creationId xmlns="" xmlns:a16="http://schemas.microsoft.com/office/drawing/2014/main" id="{EA4A0ED5-87B4-4125-A965-2C82C9D13BCB}"/>
+                <a16:creationId xmlns:a16="http://schemas.microsoft.com/office/drawing/2014/main" xmlns="" id="{EA4A0ED5-87B4-4125-A965-2C82C9D13BCB}"/>
               </a:ext>
             </a:extLst>
           </p:cNvPr>
@@ -3371,10 +3371,10 @@
           <p:cNvPr id="31" name="Rectangle 20">
             <a:extLst>
               <a:ext uri="{FF2B5EF4-FFF2-40B4-BE49-F238E27FC236}">
-                <a16:creationId xmlns="" xmlns:a16="http://schemas.microsoft.com/office/drawing/2014/main" id="{C475749F-F487-4EFB-ABC7-C1359590EB76}"/>
+                <a16:creationId xmlns:a16="http://schemas.microsoft.com/office/drawing/2014/main" xmlns="" id="{C475749F-F487-4EFB-ABC7-C1359590EB76}"/>
               </a:ext>
               <a:ext uri="{C183D7F6-B498-43B3-948B-1728B52AA6E4}">
-                <adec:decorative xmlns="" xmlns:adec="http://schemas.microsoft.com/office/drawing/2017/decorative" val="1"/>
+                <adec:decorative xmlns:adec="http://schemas.microsoft.com/office/drawing/2017/decorative" xmlns="" val="1"/>
               </a:ext>
             </a:extLst>
           </p:cNvPr>
@@ -3384,7 +3384,7 @@
           <p:nvPr>
             <p:extLst>
               <p:ext uri="{386F3935-93C4-4BCD-93E2-E3B085C9AB24}">
-                <p16:designElem xmlns="" xmlns:p16="http://schemas.microsoft.com/office/powerpoint/2015/main" val="1"/>
+                <p16:designElem xmlns:p16="http://schemas.microsoft.com/office/powerpoint/2015/main" xmlns="" val="1"/>
               </p:ext>
             </p:extLst>
           </p:nvPr>
@@ -3431,7 +3431,7 @@
           <p:cNvPr id="2" name="Title 1">
             <a:extLst>
               <a:ext uri="{FF2B5EF4-FFF2-40B4-BE49-F238E27FC236}">
-                <a16:creationId xmlns="" xmlns:a16="http://schemas.microsoft.com/office/drawing/2014/main" id="{A1276ADC-B484-4544-BDA4-7D15798E463C}"/>
+                <a16:creationId xmlns:a16="http://schemas.microsoft.com/office/drawing/2014/main" xmlns="" id="{A1276ADC-B484-4544-BDA4-7D15798E463C}"/>
               </a:ext>
             </a:extLst>
           </p:cNvPr>
@@ -3472,7 +3472,7 @@
           <p:cNvPr id="3" name="Subtitle 2">
             <a:extLst>
               <a:ext uri="{FF2B5EF4-FFF2-40B4-BE49-F238E27FC236}">
-                <a16:creationId xmlns="" xmlns:a16="http://schemas.microsoft.com/office/drawing/2014/main" id="{0AA778BB-4E5E-45D0-BEC5-F2CDBBA3D856}"/>
+                <a16:creationId xmlns:a16="http://schemas.microsoft.com/office/drawing/2014/main" xmlns="" id="{0AA778BB-4E5E-45D0-BEC5-F2CDBBA3D856}"/>
               </a:ext>
             </a:extLst>
           </p:cNvPr>
@@ -3589,10 +3589,10 @@
           <p:cNvPr id="32" name="Freeform: Shape 22">
             <a:extLst>
               <a:ext uri="{FF2B5EF4-FFF2-40B4-BE49-F238E27FC236}">
-                <a16:creationId xmlns="" xmlns:a16="http://schemas.microsoft.com/office/drawing/2014/main" id="{16D6FAA8-41A5-46EA-A8AB-E9D2754A6F32}"/>
+                <a16:creationId xmlns:a16="http://schemas.microsoft.com/office/drawing/2014/main" xmlns="" id="{16D6FAA8-41A5-46EA-A8AB-E9D2754A6F32}"/>
               </a:ext>
               <a:ext uri="{C183D7F6-B498-43B3-948B-1728B52AA6E4}">
-                <adec:decorative xmlns="" xmlns:adec="http://schemas.microsoft.com/office/drawing/2017/decorative" val="1"/>
+                <adec:decorative xmlns:adec="http://schemas.microsoft.com/office/drawing/2017/decorative" xmlns="" val="1"/>
               </a:ext>
             </a:extLst>
           </p:cNvPr>
@@ -3602,7 +3602,7 @@
           <p:nvPr>
             <p:extLst>
               <p:ext uri="{386F3935-93C4-4BCD-93E2-E3B085C9AB24}">
-                <p16:designElem xmlns="" xmlns:p16="http://schemas.microsoft.com/office/powerpoint/2015/main" val="1"/>
+                <p16:designElem xmlns:p16="http://schemas.microsoft.com/office/powerpoint/2015/main" xmlns="" val="1"/>
               </p:ext>
             </p:extLst>
           </p:nvPr>
@@ -4359,7 +4359,7 @@
           <p:cNvPr id="6" name="Title 1">
             <a:extLst>
               <a:ext uri="{FF2B5EF4-FFF2-40B4-BE49-F238E27FC236}">
-                <a16:creationId xmlns="" xmlns:a16="http://schemas.microsoft.com/office/drawing/2014/main" id="{A1276ADC-B484-4544-BDA4-7D15798E463C}"/>
+                <a16:creationId xmlns:a16="http://schemas.microsoft.com/office/drawing/2014/main" xmlns="" id="{A1276ADC-B484-4544-BDA4-7D15798E463C}"/>
               </a:ext>
             </a:extLst>
           </p:cNvPr>
@@ -4460,10 +4460,10 @@
           <p:cNvPr id="10" name="Down Arrow 7">
             <a:extLst>
               <a:ext uri="{FF2B5EF4-FFF2-40B4-BE49-F238E27FC236}">
-                <a16:creationId xmlns="" xmlns:a16="http://schemas.microsoft.com/office/drawing/2014/main" id="{D4771268-CB57-404A-9271-370EB28F6090}"/>
+                <a16:creationId xmlns:a16="http://schemas.microsoft.com/office/drawing/2014/main" xmlns="" id="{D4771268-CB57-404A-9271-370EB28F6090}"/>
               </a:ext>
               <a:ext uri="{C183D7F6-B498-43B3-948B-1728B52AA6E4}">
-                <adec:decorative xmlns="" xmlns:adec="http://schemas.microsoft.com/office/drawing/2017/decorative" val="1"/>
+                <adec:decorative xmlns:adec="http://schemas.microsoft.com/office/drawing/2017/decorative" xmlns="" val="1"/>
               </a:ext>
             </a:extLst>
           </p:cNvPr>
@@ -4473,7 +4473,7 @@
           <p:nvPr>
             <p:extLst>
               <p:ext uri="{386F3935-93C4-4BCD-93E2-E3B085C9AB24}">
-                <p16:designElem xmlns="" xmlns:p16="http://schemas.microsoft.com/office/powerpoint/2015/main" val="1"/>
+                <p16:designElem xmlns:p16="http://schemas.microsoft.com/office/powerpoint/2015/main" xmlns="" val="1"/>
               </p:ext>
             </p:extLst>
           </p:nvPr>
@@ -4526,7 +4526,7 @@
           <p:cNvPr id="2" name="Title 1">
             <a:extLst>
               <a:ext uri="{FF2B5EF4-FFF2-40B4-BE49-F238E27FC236}">
-                <a16:creationId xmlns="" xmlns:a16="http://schemas.microsoft.com/office/drawing/2014/main" id="{04CB1EA1-BD49-4423-8868-B96A7ECB3053}"/>
+                <a16:creationId xmlns:a16="http://schemas.microsoft.com/office/drawing/2014/main" xmlns="" id="{04CB1EA1-BD49-4423-8868-B96A7ECB3053}"/>
               </a:ext>
             </a:extLst>
           </p:cNvPr>
@@ -4570,7 +4570,7 @@
           <p:cNvPr id="5" name="image2.jpg">
             <a:extLst>
               <a:ext uri="{FF2B5EF4-FFF2-40B4-BE49-F238E27FC236}">
-                <a16:creationId xmlns="" xmlns:a16="http://schemas.microsoft.com/office/drawing/2014/main" id="{3772B891-1D09-4A3E-9E92-5D6EE8EEA441}"/>
+                <a16:creationId xmlns:a16="http://schemas.microsoft.com/office/drawing/2014/main" xmlns="" id="{3772B891-1D09-4A3E-9E92-5D6EE8EEA441}"/>
               </a:ext>
             </a:extLst>
           </p:cNvPr>
@@ -4643,10 +4643,10 @@
           <p:cNvPr id="9" name="Down Arrow 7">
             <a:extLst>
               <a:ext uri="{FF2B5EF4-FFF2-40B4-BE49-F238E27FC236}">
-                <a16:creationId xmlns="" xmlns:a16="http://schemas.microsoft.com/office/drawing/2014/main" id="{D4771268-CB57-404A-9271-370EB28F6090}"/>
+                <a16:creationId xmlns:a16="http://schemas.microsoft.com/office/drawing/2014/main" xmlns="" id="{D4771268-CB57-404A-9271-370EB28F6090}"/>
               </a:ext>
               <a:ext uri="{C183D7F6-B498-43B3-948B-1728B52AA6E4}">
-                <adec:decorative xmlns="" xmlns:adec="http://schemas.microsoft.com/office/drawing/2017/decorative" val="1"/>
+                <adec:decorative xmlns:adec="http://schemas.microsoft.com/office/drawing/2017/decorative" xmlns="" val="1"/>
               </a:ext>
             </a:extLst>
           </p:cNvPr>
@@ -4656,7 +4656,7 @@
           <p:nvPr>
             <p:extLst>
               <p:ext uri="{386F3935-93C4-4BCD-93E2-E3B085C9AB24}">
-                <p16:designElem xmlns="" xmlns:p16="http://schemas.microsoft.com/office/powerpoint/2015/main" val="1"/>
+                <p16:designElem xmlns:p16="http://schemas.microsoft.com/office/powerpoint/2015/main" xmlns="" val="1"/>
               </p:ext>
             </p:extLst>
           </p:nvPr>
@@ -4709,7 +4709,7 @@
           <p:cNvPr id="2" name="Title 1">
             <a:extLst>
               <a:ext uri="{FF2B5EF4-FFF2-40B4-BE49-F238E27FC236}">
-                <a16:creationId xmlns="" xmlns:a16="http://schemas.microsoft.com/office/drawing/2014/main" id="{04CB1EA1-BD49-4423-8868-B96A7ECB3053}"/>
+                <a16:creationId xmlns:a16="http://schemas.microsoft.com/office/drawing/2014/main" xmlns="" id="{04CB1EA1-BD49-4423-8868-B96A7ECB3053}"/>
               </a:ext>
             </a:extLst>
           </p:cNvPr>
@@ -4753,7 +4753,7 @@
           <p:cNvPr id="4" name="image3.jpg">
             <a:extLst>
               <a:ext uri="{FF2B5EF4-FFF2-40B4-BE49-F238E27FC236}">
-                <a16:creationId xmlns="" xmlns:a16="http://schemas.microsoft.com/office/drawing/2014/main" id="{75F8BDFB-A1CD-4102-80BD-1CF9192ABD88}"/>
+                <a16:creationId xmlns:a16="http://schemas.microsoft.com/office/drawing/2014/main" xmlns="" id="{75F8BDFB-A1CD-4102-80BD-1CF9192ABD88}"/>
               </a:ext>
             </a:extLst>
           </p:cNvPr>
@@ -5163,10 +5163,10 @@
           <p:cNvPr id="9" name="Flowchart: Document 8">
             <a:extLst>
               <a:ext uri="{FF2B5EF4-FFF2-40B4-BE49-F238E27FC236}">
-                <a16:creationId xmlns="" xmlns:a16="http://schemas.microsoft.com/office/drawing/2014/main" id="{D12DDE76-C203-4047-9998-63900085B5E8}"/>
+                <a16:creationId xmlns:a16="http://schemas.microsoft.com/office/drawing/2014/main" xmlns="" id="{D12DDE76-C203-4047-9998-63900085B5E8}"/>
               </a:ext>
               <a:ext uri="{C183D7F6-B498-43B3-948B-1728B52AA6E4}">
-                <adec:decorative xmlns="" xmlns:adec="http://schemas.microsoft.com/office/drawing/2017/decorative" val="1"/>
+                <adec:decorative xmlns:adec="http://schemas.microsoft.com/office/drawing/2017/decorative" xmlns="" val="1"/>
               </a:ext>
             </a:extLst>
           </p:cNvPr>
@@ -5176,7 +5176,7 @@
           <p:nvPr>
             <p:extLst>
               <p:ext uri="{386F3935-93C4-4BCD-93E2-E3B085C9AB24}">
-                <p16:designElem xmlns="" xmlns:p16="http://schemas.microsoft.com/office/powerpoint/2015/main" val="1"/>
+                <p16:designElem xmlns:p16="http://schemas.microsoft.com/office/powerpoint/2015/main" xmlns="" val="1"/>
               </p:ext>
             </p:extLst>
           </p:nvPr>
@@ -5226,7 +5226,7 @@
           <p:cNvPr id="2" name="Title 1">
             <a:extLst>
               <a:ext uri="{FF2B5EF4-FFF2-40B4-BE49-F238E27FC236}">
-                <a16:creationId xmlns="" xmlns:a16="http://schemas.microsoft.com/office/drawing/2014/main" id="{6ED46941-612B-4204-8306-8F00C904F7BE}"/>
+                <a16:creationId xmlns:a16="http://schemas.microsoft.com/office/drawing/2014/main" xmlns="" id="{6ED46941-612B-4204-8306-8F00C904F7BE}"/>
               </a:ext>
             </a:extLst>
           </p:cNvPr>
@@ -5265,27 +5265,22 @@
       </p:sp>
       <p:pic>
         <p:nvPicPr>
-          <p:cNvPr id="4" name="image7.png">
-            <a:extLst>
-              <a:ext uri="{FF2B5EF4-FFF2-40B4-BE49-F238E27FC236}">
-                <a16:creationId xmlns="" xmlns:a16="http://schemas.microsoft.com/office/drawing/2014/main" id="{511CDDEA-5A35-4205-9A85-9064BDA2EFB9}"/>
-              </a:ext>
-            </a:extLst>
-          </p:cNvPr>
-          <p:cNvPicPr/>
+          <p:cNvPr id="3" name="Picture 2"/>
+          <p:cNvPicPr>
+            <a:picLocks noChangeAspect="1"/>
+          </p:cNvPicPr>
           <p:nvPr/>
         </p:nvPicPr>
         <p:blipFill>
           <a:blip r:embed="rId2"/>
-          <a:srcRect l="31410" t="17333" r="52724" b="57626"/>
           <a:stretch>
             <a:fillRect/>
           </a:stretch>
         </p:blipFill>
         <p:spPr>
           <a:xfrm>
-            <a:off x="4739709" y="640080"/>
-            <a:ext cx="6283985" cy="5578816"/>
+            <a:off x="5273301" y="901462"/>
+            <a:ext cx="5866924" cy="5267518"/>
           </a:xfrm>
           <a:prstGeom prst="rect">
             <a:avLst/>
@@ -5342,10 +5337,10 @@
           <p:cNvPr id="9" name="Down Arrow 7">
             <a:extLst>
               <a:ext uri="{FF2B5EF4-FFF2-40B4-BE49-F238E27FC236}">
-                <a16:creationId xmlns="" xmlns:a16="http://schemas.microsoft.com/office/drawing/2014/main" id="{D4771268-CB57-404A-9271-370EB28F6090}"/>
+                <a16:creationId xmlns:a16="http://schemas.microsoft.com/office/drawing/2014/main" xmlns="" id="{D4771268-CB57-404A-9271-370EB28F6090}"/>
               </a:ext>
               <a:ext uri="{C183D7F6-B498-43B3-948B-1728B52AA6E4}">
-                <adec:decorative xmlns="" xmlns:adec="http://schemas.microsoft.com/office/drawing/2017/decorative" val="1"/>
+                <adec:decorative xmlns:adec="http://schemas.microsoft.com/office/drawing/2017/decorative" xmlns="" val="1"/>
               </a:ext>
             </a:extLst>
           </p:cNvPr>
@@ -5355,7 +5350,7 @@
           <p:nvPr>
             <p:extLst>
               <p:ext uri="{386F3935-93C4-4BCD-93E2-E3B085C9AB24}">
-                <p16:designElem xmlns="" xmlns:p16="http://schemas.microsoft.com/office/powerpoint/2015/main" val="1"/>
+                <p16:designElem xmlns:p16="http://schemas.microsoft.com/office/powerpoint/2015/main" xmlns="" val="1"/>
               </p:ext>
             </p:extLst>
           </p:nvPr>
@@ -5408,7 +5403,7 @@
           <p:cNvPr id="2" name="Title 1">
             <a:extLst>
               <a:ext uri="{FF2B5EF4-FFF2-40B4-BE49-F238E27FC236}">
-                <a16:creationId xmlns="" xmlns:a16="http://schemas.microsoft.com/office/drawing/2014/main" id="{2D1220C7-2514-40FF-9443-AFD565137351}"/>
+                <a16:creationId xmlns:a16="http://schemas.microsoft.com/office/drawing/2014/main" xmlns="" id="{2D1220C7-2514-40FF-9443-AFD565137351}"/>
               </a:ext>
             </a:extLst>
           </p:cNvPr>
@@ -5460,7 +5455,7 @@
           <p:cNvPr id="4" name="image5.png">
             <a:extLst>
               <a:ext uri="{FF2B5EF4-FFF2-40B4-BE49-F238E27FC236}">
-                <a16:creationId xmlns="" xmlns:a16="http://schemas.microsoft.com/office/drawing/2014/main" id="{41125F34-68BE-4774-BFE2-31BF9501A746}"/>
+                <a16:creationId xmlns:a16="http://schemas.microsoft.com/office/drawing/2014/main" xmlns="" id="{41125F34-68BE-4774-BFE2-31BF9501A746}"/>
               </a:ext>
             </a:extLst>
           </p:cNvPr>
@@ -5534,10 +5529,10 @@
           <p:cNvPr id="9" name="Flowchart: Document 8">
             <a:extLst>
               <a:ext uri="{FF2B5EF4-FFF2-40B4-BE49-F238E27FC236}">
-                <a16:creationId xmlns="" xmlns:a16="http://schemas.microsoft.com/office/drawing/2014/main" id="{D12DDE76-C203-4047-9998-63900085B5E8}"/>
+                <a16:creationId xmlns:a16="http://schemas.microsoft.com/office/drawing/2014/main" xmlns="" id="{D12DDE76-C203-4047-9998-63900085B5E8}"/>
               </a:ext>
               <a:ext uri="{C183D7F6-B498-43B3-948B-1728B52AA6E4}">
-                <adec:decorative xmlns="" xmlns:adec="http://schemas.microsoft.com/office/drawing/2017/decorative" val="1"/>
+                <adec:decorative xmlns:adec="http://schemas.microsoft.com/office/drawing/2017/decorative" xmlns="" val="1"/>
               </a:ext>
             </a:extLst>
           </p:cNvPr>
@@ -5547,7 +5542,7 @@
           <p:nvPr>
             <p:extLst>
               <p:ext uri="{386F3935-93C4-4BCD-93E2-E3B085C9AB24}">
-                <p16:designElem xmlns="" xmlns:p16="http://schemas.microsoft.com/office/powerpoint/2015/main" val="1"/>
+                <p16:designElem xmlns:p16="http://schemas.microsoft.com/office/powerpoint/2015/main" xmlns="" val="1"/>
               </p:ext>
             </p:extLst>
           </p:nvPr>
@@ -5597,7 +5592,7 @@
           <p:cNvPr id="2" name="Title 1">
             <a:extLst>
               <a:ext uri="{FF2B5EF4-FFF2-40B4-BE49-F238E27FC236}">
-                <a16:creationId xmlns="" xmlns:a16="http://schemas.microsoft.com/office/drawing/2014/main" id="{9475DB4F-A707-4A3D-AED9-A62288A5735C}"/>
+                <a16:creationId xmlns:a16="http://schemas.microsoft.com/office/drawing/2014/main" xmlns="" id="{9475DB4F-A707-4A3D-AED9-A62288A5735C}"/>
               </a:ext>
             </a:extLst>
           </p:cNvPr>
@@ -5648,7 +5643,7 @@
           <p:cNvPr id="4" name="image11.png">
             <a:extLst>
               <a:ext uri="{FF2B5EF4-FFF2-40B4-BE49-F238E27FC236}">
-                <a16:creationId xmlns="" xmlns:a16="http://schemas.microsoft.com/office/drawing/2014/main" id="{227FDBA5-35B6-44CD-969A-BFCA0AF865D3}"/>
+                <a16:creationId xmlns:a16="http://schemas.microsoft.com/office/drawing/2014/main" xmlns="" id="{227FDBA5-35B6-44CD-969A-BFCA0AF865D3}"/>
               </a:ext>
             </a:extLst>
           </p:cNvPr>
@@ -5722,10 +5717,10 @@
           <p:cNvPr id="9" name="Down Arrow 7">
             <a:extLst>
               <a:ext uri="{FF2B5EF4-FFF2-40B4-BE49-F238E27FC236}">
-                <a16:creationId xmlns="" xmlns:a16="http://schemas.microsoft.com/office/drawing/2014/main" id="{D4771268-CB57-404A-9271-370EB28F6090}"/>
+                <a16:creationId xmlns:a16="http://schemas.microsoft.com/office/drawing/2014/main" xmlns="" id="{D4771268-CB57-404A-9271-370EB28F6090}"/>
               </a:ext>
               <a:ext uri="{C183D7F6-B498-43B3-948B-1728B52AA6E4}">
-                <adec:decorative xmlns="" xmlns:adec="http://schemas.microsoft.com/office/drawing/2017/decorative" val="1"/>
+                <adec:decorative xmlns:adec="http://schemas.microsoft.com/office/drawing/2017/decorative" xmlns="" val="1"/>
               </a:ext>
             </a:extLst>
           </p:cNvPr>
@@ -5735,7 +5730,7 @@
           <p:nvPr>
             <p:extLst>
               <p:ext uri="{386F3935-93C4-4BCD-93E2-E3B085C9AB24}">
-                <p16:designElem xmlns="" xmlns:p16="http://schemas.microsoft.com/office/powerpoint/2015/main" val="1"/>
+                <p16:designElem xmlns:p16="http://schemas.microsoft.com/office/powerpoint/2015/main" xmlns="" val="1"/>
               </p:ext>
             </p:extLst>
           </p:nvPr>
@@ -5788,7 +5783,7 @@
           <p:cNvPr id="2" name="Title 1">
             <a:extLst>
               <a:ext uri="{FF2B5EF4-FFF2-40B4-BE49-F238E27FC236}">
-                <a16:creationId xmlns="" xmlns:a16="http://schemas.microsoft.com/office/drawing/2014/main" id="{E38564CB-AF77-43B0-B6D6-035222C6B32C}"/>
+                <a16:creationId xmlns:a16="http://schemas.microsoft.com/office/drawing/2014/main" xmlns="" id="{E38564CB-AF77-43B0-B6D6-035222C6B32C}"/>
               </a:ext>
             </a:extLst>
           </p:cNvPr>
@@ -5829,27 +5824,22 @@
       </p:sp>
       <p:pic>
         <p:nvPicPr>
-          <p:cNvPr id="4" name="image6.png">
-            <a:extLst>
-              <a:ext uri="{FF2B5EF4-FFF2-40B4-BE49-F238E27FC236}">
-                <a16:creationId xmlns="" xmlns:a16="http://schemas.microsoft.com/office/drawing/2014/main" id="{EE16F361-A788-401D-B200-83D8DB608BC0}"/>
-              </a:ext>
-            </a:extLst>
-          </p:cNvPr>
-          <p:cNvPicPr/>
+          <p:cNvPr id="3" name="Picture 2"/>
+          <p:cNvPicPr>
+            <a:picLocks noChangeAspect="1"/>
+          </p:cNvPicPr>
           <p:nvPr/>
         </p:nvPicPr>
         <p:blipFill>
           <a:blip r:embed="rId2"/>
-          <a:srcRect l="31730" t="17465" r="41826" b="51141"/>
           <a:stretch>
             <a:fillRect/>
           </a:stretch>
         </p:blipFill>
         <p:spPr>
           <a:xfrm>
-            <a:off x="4777316" y="1163784"/>
-            <a:ext cx="6780700" cy="4528102"/>
+            <a:off x="4527804" y="1032029"/>
+            <a:ext cx="6950429" cy="4505886"/>
           </a:xfrm>
           <a:prstGeom prst="rect">
             <a:avLst/>
@@ -5906,10 +5896,10 @@
           <p:cNvPr id="10" name="Flowchart: Document 9">
             <a:extLst>
               <a:ext uri="{FF2B5EF4-FFF2-40B4-BE49-F238E27FC236}">
-                <a16:creationId xmlns="" xmlns:a16="http://schemas.microsoft.com/office/drawing/2014/main" id="{D12DDE76-C203-4047-9998-63900085B5E8}"/>
+                <a16:creationId xmlns:a16="http://schemas.microsoft.com/office/drawing/2014/main" xmlns="" id="{D12DDE76-C203-4047-9998-63900085B5E8}"/>
               </a:ext>
               <a:ext uri="{C183D7F6-B498-43B3-948B-1728B52AA6E4}">
-                <adec:decorative xmlns="" xmlns:adec="http://schemas.microsoft.com/office/drawing/2017/decorative" val="1"/>
+                <adec:decorative xmlns:adec="http://schemas.microsoft.com/office/drawing/2017/decorative" xmlns="" val="1"/>
               </a:ext>
             </a:extLst>
           </p:cNvPr>
@@ -5919,7 +5909,7 @@
           <p:nvPr>
             <p:extLst>
               <p:ext uri="{386F3935-93C4-4BCD-93E2-E3B085C9AB24}">
-                <p16:designElem xmlns="" xmlns:p16="http://schemas.microsoft.com/office/powerpoint/2015/main" val="1"/>
+                <p16:designElem xmlns:p16="http://schemas.microsoft.com/office/powerpoint/2015/main" xmlns="" val="1"/>
               </p:ext>
             </p:extLst>
           </p:nvPr>
@@ -5969,7 +5959,7 @@
           <p:cNvPr id="2" name="Title 1">
             <a:extLst>
               <a:ext uri="{FF2B5EF4-FFF2-40B4-BE49-F238E27FC236}">
-                <a16:creationId xmlns="" xmlns:a16="http://schemas.microsoft.com/office/drawing/2014/main" id="{E38564CB-AF77-43B0-B6D6-035222C6B32C}"/>
+                <a16:creationId xmlns:a16="http://schemas.microsoft.com/office/drawing/2014/main" xmlns="" id="{E38564CB-AF77-43B0-B6D6-035222C6B32C}"/>
               </a:ext>
             </a:extLst>
           </p:cNvPr>
@@ -6011,7 +6001,7 @@
           <p:cNvPr id="5" name="image4.png">
             <a:extLst>
               <a:ext uri="{FF2B5EF4-FFF2-40B4-BE49-F238E27FC236}">
-                <a16:creationId xmlns="" xmlns:a16="http://schemas.microsoft.com/office/drawing/2014/main" id="{74F4D572-AFCF-4DE1-BF36-0F9A19B9DE6A}"/>
+                <a16:creationId xmlns:a16="http://schemas.microsoft.com/office/drawing/2014/main" xmlns="" id="{74F4D572-AFCF-4DE1-BF36-0F9A19B9DE6A}"/>
               </a:ext>
             </a:extLst>
           </p:cNvPr>
@@ -6085,10 +6075,10 @@
           <p:cNvPr id="9" name="Down Arrow 7">
             <a:extLst>
               <a:ext uri="{FF2B5EF4-FFF2-40B4-BE49-F238E27FC236}">
-                <a16:creationId xmlns="" xmlns:a16="http://schemas.microsoft.com/office/drawing/2014/main" id="{D4771268-CB57-404A-9271-370EB28F6090}"/>
+                <a16:creationId xmlns:a16="http://schemas.microsoft.com/office/drawing/2014/main" xmlns="" id="{D4771268-CB57-404A-9271-370EB28F6090}"/>
               </a:ext>
               <a:ext uri="{C183D7F6-B498-43B3-948B-1728B52AA6E4}">
-                <adec:decorative xmlns="" xmlns:adec="http://schemas.microsoft.com/office/drawing/2017/decorative" val="1"/>
+                <adec:decorative xmlns:adec="http://schemas.microsoft.com/office/drawing/2017/decorative" xmlns="" val="1"/>
               </a:ext>
             </a:extLst>
           </p:cNvPr>
@@ -6098,7 +6088,7 @@
           <p:nvPr>
             <p:extLst>
               <p:ext uri="{386F3935-93C4-4BCD-93E2-E3B085C9AB24}">
-                <p16:designElem xmlns="" xmlns:p16="http://schemas.microsoft.com/office/powerpoint/2015/main" val="1"/>
+                <p16:designElem xmlns:p16="http://schemas.microsoft.com/office/powerpoint/2015/main" xmlns="" val="1"/>
               </p:ext>
             </p:extLst>
           </p:nvPr>
@@ -6151,7 +6141,7 @@
           <p:cNvPr id="2" name="Title 1">
             <a:extLst>
               <a:ext uri="{FF2B5EF4-FFF2-40B4-BE49-F238E27FC236}">
-                <a16:creationId xmlns="" xmlns:a16="http://schemas.microsoft.com/office/drawing/2014/main" id="{E38564CB-AF77-43B0-B6D6-035222C6B32C}"/>
+                <a16:creationId xmlns:a16="http://schemas.microsoft.com/office/drawing/2014/main" xmlns="" id="{E38564CB-AF77-43B0-B6D6-035222C6B32C}"/>
               </a:ext>
             </a:extLst>
           </p:cNvPr>
@@ -6195,7 +6185,7 @@
           <p:cNvPr id="4" name="image10.png">
             <a:extLst>
               <a:ext uri="{FF2B5EF4-FFF2-40B4-BE49-F238E27FC236}">
-                <a16:creationId xmlns="" xmlns:a16="http://schemas.microsoft.com/office/drawing/2014/main" id="{4709218A-957C-42BE-976E-09C81486AE0D}"/>
+                <a16:creationId xmlns:a16="http://schemas.microsoft.com/office/drawing/2014/main" xmlns="" id="{4709218A-957C-42BE-976E-09C81486AE0D}"/>
               </a:ext>
             </a:extLst>
           </p:cNvPr>
@@ -6269,7 +6259,7 @@
           <p:cNvPr id="2" name="Title 1">
             <a:extLst>
               <a:ext uri="{FF2B5EF4-FFF2-40B4-BE49-F238E27FC236}">
-                <a16:creationId xmlns="" xmlns:a16="http://schemas.microsoft.com/office/drawing/2014/main" id="{04CB1EA1-BD49-4423-8868-B96A7ECB3053}"/>
+                <a16:creationId xmlns:a16="http://schemas.microsoft.com/office/drawing/2014/main" xmlns="" id="{04CB1EA1-BD49-4423-8868-B96A7ECB3053}"/>
               </a:ext>
             </a:extLst>
           </p:cNvPr>
@@ -6412,7 +6402,7 @@
           <p:cNvPr id="2" name="Title 1">
             <a:extLst>
               <a:ext uri="{FF2B5EF4-FFF2-40B4-BE49-F238E27FC236}">
-                <a16:creationId xmlns="" xmlns:a16="http://schemas.microsoft.com/office/drawing/2014/main" id="{04CB1EA1-BD49-4423-8868-B96A7ECB3053}"/>
+                <a16:creationId xmlns:a16="http://schemas.microsoft.com/office/drawing/2014/main" xmlns="" id="{04CB1EA1-BD49-4423-8868-B96A7ECB3053}"/>
               </a:ext>
             </a:extLst>
           </p:cNvPr>
@@ -6480,7 +6470,7 @@
           <p:cNvPr id="4" name="image8.jpg">
             <a:extLst>
               <a:ext uri="{FF2B5EF4-FFF2-40B4-BE49-F238E27FC236}">
-                <a16:creationId xmlns="" xmlns:a16="http://schemas.microsoft.com/office/drawing/2014/main" id="{98E3AA5C-2BB7-4C05-AD93-CA7C4BB78D4A}"/>
+                <a16:creationId xmlns:a16="http://schemas.microsoft.com/office/drawing/2014/main" xmlns="" id="{98E3AA5C-2BB7-4C05-AD93-CA7C4BB78D4A}"/>
               </a:ext>
             </a:extLst>
           </p:cNvPr>

</xml_diff>